<commit_message>
Fixing bug where the wrong google sheet is used
</commit_message>
<xml_diff>
--- a/running_EFD_source_code.pptx
+++ b/running_EFD_source_code.pptx
@@ -3220,7 +3220,7 @@
               <a:pPr>
                 <a:defRPr/>
               </a:pPr>
-              <a:t>5/19/21</a:t>
+              <a:t>5/21/21</a:t>
             </a:fld>
             <a:endParaRPr lang="en-US"/>
           </a:p>
@@ -8988,7 +8988,15 @@
             <a:pPr lvl="1"/>
             <a:r>
               <a:rPr lang="en-US" sz="1400" dirty="0"/>
-              <a:t>Column A specifies the region: 1 = Northwest, 2 = California, 3 = Mountain North, 4 – Southwest, 5 = Central, 6 = Texas, 7 = Midwest, 8 = AL, 9 = Mid-Atlantic, 10 = Southeast, 11 = Florida, 12 = New York, 13 = New England</a:t>
+              <a:t>Column A specifies the region: 1 = Northwest, 2 = California, 3 = Mountain North, 4 = Southwest, 5 = Central, 6 = Texas, 7 = Midwest, 8 = Arkansas</a:t>
+            </a:r>
+            <a:r>
+              <a:rPr lang="en-US" sz="1400"/>
+              <a:t>/Louisiana, </a:t>
+            </a:r>
+            <a:r>
+              <a:rPr lang="en-US" sz="1400" dirty="0"/>
+              <a:t>9 = Mid-Atlantic, 10 = Southeast, 11 = Florida, 12 = New York, 13 = New England</a:t>
             </a:r>
           </a:p>
           <a:p>

</xml_diff>